<commit_message>
TCC Final Report Update, Stage Report created, Presentation Updated
</commit_message>
<xml_diff>
--- a/relatorio/abntex2-modelos-1.9.2/figuras/apresentacao.pptx
+++ b/relatorio/abntex2-modelos-1.9.2/figuras/apresentacao.pptx
@@ -1143,7 +1143,7 @@
               <a:rPr lang="pt-PT" baseline="0" dirty="0" smtClean="0">
                 <a:sym typeface="Wingdings" panose="05000000000000000000" pitchFamily="2" charset="2"/>
               </a:rPr>
-              <a:t> Contadores dão origem ao PCR</a:t>
+              <a:t> Contadores dão origem ao PCR  repetido a cada 100ms max</a:t>
             </a:r>
             <a:endParaRPr lang="pt-PT" baseline="0" dirty="0" smtClean="0"/>
           </a:p>
@@ -1780,6 +1780,37 @@
             <a:endParaRPr lang="pt-BR" dirty="0" smtClean="0"/>
           </a:p>
           <a:p>
+            <a:pPr marL="0" marR="0" indent="0" algn="l" defTabSz="914400" rtl="0" eaLnBrk="1" fontAlgn="auto" latinLnBrk="0" hangingPunct="1">
+              <a:lnSpc>
+                <a:spcPct val="100000"/>
+              </a:lnSpc>
+              <a:spcBef>
+                <a:spcPts val="0"/>
+              </a:spcBef>
+              <a:spcAft>
+                <a:spcPts val="0"/>
+              </a:spcAft>
+              <a:buClrTx/>
+              <a:buSzTx/>
+              <a:buFontTx/>
+              <a:buNone/>
+              <a:tabLst/>
+              <a:defRPr/>
+            </a:pPr>
+            <a:r>
+              <a:rPr lang="pt-BR" baseline="0" dirty="0" smtClean="0"/>
+              <a:t>PMT: Tem o PID apontado pela PAT, lista todos os </a:t>
+            </a:r>
+            <a:r>
+              <a:rPr lang="pt-BR" baseline="0" dirty="0" err="1" smtClean="0"/>
+              <a:t>ESs</a:t>
+            </a:r>
+            <a:r>
+              <a:rPr lang="pt-BR" baseline="0" dirty="0" smtClean="0"/>
+              <a:t> de um serviço e também o PCR daquele serviço</a:t>
+            </a:r>
+          </a:p>
+          <a:p>
             <a:r>
               <a:rPr lang="pt-BR" dirty="0" smtClean="0"/>
               <a:t>PAT</a:t>
@@ -1807,20 +1838,6 @@
             <a:r>
               <a:rPr lang="pt-BR" baseline="0" dirty="0" smtClean="0"/>
               <a:t> de cada serviço contidos no TS, bem como o PID da NIT.</a:t>
-            </a:r>
-          </a:p>
-          <a:p>
-            <a:r>
-              <a:rPr lang="pt-BR" baseline="0" dirty="0" smtClean="0"/>
-              <a:t>PMT: Tem o PID apontado pela PAT, lista todos os </a:t>
-            </a:r>
-            <a:r>
-              <a:rPr lang="pt-BR" baseline="0" dirty="0" err="1" smtClean="0"/>
-              <a:t>ESs</a:t>
-            </a:r>
-            <a:r>
-              <a:rPr lang="pt-BR" baseline="0" dirty="0" smtClean="0"/>
-              <a:t> de um serviço e também o PCR daquele serviço</a:t>
             </a:r>
           </a:p>
           <a:p>
@@ -11478,12 +11495,20 @@
               <a:defRPr/>
             </a:pPr>
             <a:r>
+              <a:rPr lang="pt-PT" dirty="0">
+                <a:solidFill>
+                  <a:srgbClr val="002060"/>
+                </a:solidFill>
+              </a:rPr>
+              <a:t>Multiplexador </a:t>
+            </a:r>
+            <a:r>
               <a:rPr lang="pt-PT" dirty="0" smtClean="0">
                 <a:solidFill>
                   <a:srgbClr val="002060"/>
                 </a:solidFill>
               </a:rPr>
-              <a:t>MPEG2 Multiplexer</a:t>
+              <a:t>MPEG2</a:t>
             </a:r>
             <a:endParaRPr lang="pt-PT" dirty="0">
               <a:solidFill>
@@ -11962,6 +11987,326 @@
           </a:fontRef>
         </p:style>
       </p:cxnSp>
+      <p:sp>
+        <p:nvSpPr>
+          <p:cNvPr id="63" name="Retângulo de cantos arredondados 62"/>
+          <p:cNvSpPr/>
+          <p:nvPr/>
+        </p:nvSpPr>
+        <p:spPr>
+          <a:xfrm>
+            <a:off x="9249677" y="5274188"/>
+            <a:ext cx="1790700" cy="577851"/>
+          </a:xfrm>
+          <a:prstGeom prst="roundRect">
+            <a:avLst/>
+          </a:prstGeom>
+        </p:spPr>
+        <p:style>
+          <a:lnRef idx="2">
+            <a:schemeClr val="accent6">
+              <a:shade val="50000"/>
+            </a:schemeClr>
+          </a:lnRef>
+          <a:fillRef idx="1">
+            <a:schemeClr val="accent6"/>
+          </a:fillRef>
+          <a:effectRef idx="0">
+            <a:schemeClr val="accent6"/>
+          </a:effectRef>
+          <a:fontRef idx="minor">
+            <a:schemeClr val="lt1"/>
+          </a:fontRef>
+        </p:style>
+        <p:txBody>
+          <a:bodyPr anchor="ctr"/>
+          <a:lstStyle/>
+          <a:p>
+            <a:pPr algn="ctr" fontAlgn="auto">
+              <a:spcBef>
+                <a:spcPts val="0"/>
+              </a:spcBef>
+              <a:spcAft>
+                <a:spcPts val="0"/>
+              </a:spcAft>
+              <a:defRPr/>
+            </a:pPr>
+            <a:r>
+              <a:rPr lang="pt-PT" sz="1600" dirty="0" smtClean="0"/>
+              <a:t>Codif. De </a:t>
+            </a:r>
+            <a:r>
+              <a:rPr lang="pt-PT" sz="1600" dirty="0" smtClean="0"/>
+              <a:t>Correção de Erros</a:t>
+            </a:r>
+            <a:endParaRPr lang="pt-PT" sz="1600" dirty="0"/>
+          </a:p>
+        </p:txBody>
+      </p:sp>
+      <p:sp>
+        <p:nvSpPr>
+          <p:cNvPr id="64" name="Retângulo de cantos arredondados 63"/>
+          <p:cNvSpPr/>
+          <p:nvPr/>
+        </p:nvSpPr>
+        <p:spPr>
+          <a:xfrm>
+            <a:off x="9248539" y="4501035"/>
+            <a:ext cx="1790700" cy="425451"/>
+          </a:xfrm>
+          <a:prstGeom prst="roundRect">
+            <a:avLst/>
+          </a:prstGeom>
+        </p:spPr>
+        <p:style>
+          <a:lnRef idx="2">
+            <a:schemeClr val="accent6">
+              <a:shade val="50000"/>
+            </a:schemeClr>
+          </a:lnRef>
+          <a:fillRef idx="1">
+            <a:schemeClr val="accent6"/>
+          </a:fillRef>
+          <a:effectRef idx="0">
+            <a:schemeClr val="accent6"/>
+          </a:effectRef>
+          <a:fontRef idx="minor">
+            <a:schemeClr val="lt1"/>
+          </a:fontRef>
+        </p:style>
+        <p:txBody>
+          <a:bodyPr anchor="ctr"/>
+          <a:lstStyle/>
+          <a:p>
+            <a:pPr algn="ctr" fontAlgn="auto">
+              <a:spcBef>
+                <a:spcPts val="0"/>
+              </a:spcBef>
+              <a:spcAft>
+                <a:spcPts val="0"/>
+              </a:spcAft>
+              <a:defRPr/>
+            </a:pPr>
+            <a:r>
+              <a:rPr lang="pt-PT" dirty="0" smtClean="0"/>
+              <a:t>Modulador</a:t>
+            </a:r>
+            <a:endParaRPr lang="pt-PT" dirty="0"/>
+          </a:p>
+        </p:txBody>
+      </p:sp>
+      <p:sp>
+        <p:nvSpPr>
+          <p:cNvPr id="71" name="Retângulo de cantos arredondados 70"/>
+          <p:cNvSpPr/>
+          <p:nvPr/>
+        </p:nvSpPr>
+        <p:spPr>
+          <a:xfrm>
+            <a:off x="2694113" y="2932692"/>
+            <a:ext cx="1479011" cy="577851"/>
+          </a:xfrm>
+          <a:prstGeom prst="roundRect">
+            <a:avLst/>
+          </a:prstGeom>
+        </p:spPr>
+        <p:style>
+          <a:lnRef idx="2">
+            <a:schemeClr val="accent6">
+              <a:shade val="50000"/>
+            </a:schemeClr>
+          </a:lnRef>
+          <a:fillRef idx="1">
+            <a:schemeClr val="accent6"/>
+          </a:fillRef>
+          <a:effectRef idx="0">
+            <a:schemeClr val="accent6"/>
+          </a:effectRef>
+          <a:fontRef idx="minor">
+            <a:schemeClr val="lt1"/>
+          </a:fontRef>
+        </p:style>
+        <p:txBody>
+          <a:bodyPr anchor="ctr"/>
+          <a:lstStyle/>
+          <a:p>
+            <a:pPr algn="ctr" fontAlgn="auto">
+              <a:spcBef>
+                <a:spcPts val="0"/>
+              </a:spcBef>
+              <a:spcAft>
+                <a:spcPts val="0"/>
+              </a:spcAft>
+              <a:defRPr/>
+            </a:pPr>
+            <a:r>
+              <a:rPr lang="pt-PT" dirty="0" smtClean="0"/>
+              <a:t>Codificador de Video</a:t>
+            </a:r>
+            <a:endParaRPr lang="pt-PT" dirty="0"/>
+          </a:p>
+        </p:txBody>
+      </p:sp>
+      <p:sp>
+        <p:nvSpPr>
+          <p:cNvPr id="76" name="Retângulo de cantos arredondados 75"/>
+          <p:cNvSpPr/>
+          <p:nvPr/>
+        </p:nvSpPr>
+        <p:spPr>
+          <a:xfrm>
+            <a:off x="2668713" y="3661356"/>
+            <a:ext cx="1504411" cy="523875"/>
+          </a:xfrm>
+          <a:prstGeom prst="roundRect">
+            <a:avLst/>
+          </a:prstGeom>
+        </p:spPr>
+        <p:style>
+          <a:lnRef idx="2">
+            <a:schemeClr val="accent6">
+              <a:shade val="50000"/>
+            </a:schemeClr>
+          </a:lnRef>
+          <a:fillRef idx="1">
+            <a:schemeClr val="accent6"/>
+          </a:fillRef>
+          <a:effectRef idx="0">
+            <a:schemeClr val="accent6"/>
+          </a:effectRef>
+          <a:fontRef idx="minor">
+            <a:schemeClr val="lt1"/>
+          </a:fontRef>
+        </p:style>
+        <p:txBody>
+          <a:bodyPr anchor="ctr"/>
+          <a:lstStyle/>
+          <a:p>
+            <a:pPr algn="ctr" fontAlgn="auto">
+              <a:spcBef>
+                <a:spcPts val="0"/>
+              </a:spcBef>
+              <a:spcAft>
+                <a:spcPts val="0"/>
+              </a:spcAft>
+              <a:defRPr/>
+            </a:pPr>
+            <a:r>
+              <a:rPr lang="pt-PT" dirty="0"/>
+              <a:t>Codificador </a:t>
+            </a:r>
+            <a:r>
+              <a:rPr lang="pt-PT" dirty="0" smtClean="0"/>
+              <a:t>de Áudio</a:t>
+            </a:r>
+            <a:endParaRPr lang="pt-PT" dirty="0"/>
+          </a:p>
+        </p:txBody>
+      </p:sp>
+      <p:sp>
+        <p:nvSpPr>
+          <p:cNvPr id="77" name="Retângulo de cantos arredondados 76"/>
+          <p:cNvSpPr/>
+          <p:nvPr/>
+        </p:nvSpPr>
+        <p:spPr>
+          <a:xfrm>
+            <a:off x="2681413" y="4306658"/>
+            <a:ext cx="1479011" cy="577851"/>
+          </a:xfrm>
+          <a:prstGeom prst="roundRect">
+            <a:avLst/>
+          </a:prstGeom>
+        </p:spPr>
+        <p:style>
+          <a:lnRef idx="2">
+            <a:schemeClr val="accent6">
+              <a:shade val="50000"/>
+            </a:schemeClr>
+          </a:lnRef>
+          <a:fillRef idx="1">
+            <a:schemeClr val="accent6"/>
+          </a:fillRef>
+          <a:effectRef idx="0">
+            <a:schemeClr val="accent6"/>
+          </a:effectRef>
+          <a:fontRef idx="minor">
+            <a:schemeClr val="lt1"/>
+          </a:fontRef>
+        </p:style>
+        <p:txBody>
+          <a:bodyPr anchor="ctr"/>
+          <a:lstStyle/>
+          <a:p>
+            <a:pPr algn="ctr" fontAlgn="auto">
+              <a:spcBef>
+                <a:spcPts val="0"/>
+              </a:spcBef>
+              <a:spcAft>
+                <a:spcPts val="0"/>
+              </a:spcAft>
+              <a:defRPr/>
+            </a:pPr>
+            <a:r>
+              <a:rPr lang="pt-PT" dirty="0"/>
+              <a:t>Codificador de Video</a:t>
+            </a:r>
+            <a:endParaRPr lang="pt-PT" dirty="0"/>
+          </a:p>
+        </p:txBody>
+      </p:sp>
+      <p:sp>
+        <p:nvSpPr>
+          <p:cNvPr id="78" name="Retângulo de cantos arredondados 77"/>
+          <p:cNvSpPr/>
+          <p:nvPr/>
+        </p:nvSpPr>
+        <p:spPr>
+          <a:xfrm>
+            <a:off x="2656013" y="5035322"/>
+            <a:ext cx="1504411" cy="523875"/>
+          </a:xfrm>
+          <a:prstGeom prst="roundRect">
+            <a:avLst/>
+          </a:prstGeom>
+        </p:spPr>
+        <p:style>
+          <a:lnRef idx="2">
+            <a:schemeClr val="accent6">
+              <a:shade val="50000"/>
+            </a:schemeClr>
+          </a:lnRef>
+          <a:fillRef idx="1">
+            <a:schemeClr val="accent6"/>
+          </a:fillRef>
+          <a:effectRef idx="0">
+            <a:schemeClr val="accent6"/>
+          </a:effectRef>
+          <a:fontRef idx="minor">
+            <a:schemeClr val="lt1"/>
+          </a:fontRef>
+        </p:style>
+        <p:txBody>
+          <a:bodyPr anchor="ctr"/>
+          <a:lstStyle/>
+          <a:p>
+            <a:pPr algn="ctr" fontAlgn="auto">
+              <a:spcBef>
+                <a:spcPts val="0"/>
+              </a:spcBef>
+              <a:spcAft>
+                <a:spcPts val="0"/>
+              </a:spcAft>
+              <a:defRPr/>
+            </a:pPr>
+            <a:r>
+              <a:rPr lang="pt-PT" dirty="0"/>
+              <a:t>Codificador de Áudio</a:t>
+            </a:r>
+            <a:endParaRPr lang="pt-PT" dirty="0"/>
+          </a:p>
+        </p:txBody>
+      </p:sp>
     </p:spTree>
     <p:extLst>
       <p:ext uri="{BB962C8B-B14F-4D97-AF65-F5344CB8AC3E}">
@@ -14021,12 +14366,20 @@
               <a:defRPr/>
             </a:pPr>
             <a:r>
+              <a:rPr lang="pt-PT" dirty="0">
+                <a:solidFill>
+                  <a:srgbClr val="002060"/>
+                </a:solidFill>
+              </a:rPr>
+              <a:t>Multiplexador </a:t>
+            </a:r>
+            <a:r>
               <a:rPr lang="pt-PT" dirty="0" smtClean="0">
                 <a:solidFill>
                   <a:srgbClr val="002060"/>
                 </a:solidFill>
               </a:rPr>
-              <a:t>MPEG2 Multiplexer</a:t>
+              <a:t>MPEG2</a:t>
             </a:r>
             <a:endParaRPr lang="pt-PT" dirty="0">
               <a:solidFill>
@@ -14425,6 +14778,326 @@
           </a:fontRef>
         </p:style>
       </p:cxnSp>
+      <p:sp>
+        <p:nvSpPr>
+          <p:cNvPr id="53" name="Retângulo de cantos arredondados 52"/>
+          <p:cNvSpPr/>
+          <p:nvPr/>
+        </p:nvSpPr>
+        <p:spPr>
+          <a:xfrm>
+            <a:off x="9249677" y="5274188"/>
+            <a:ext cx="1790700" cy="577851"/>
+          </a:xfrm>
+          <a:prstGeom prst="roundRect">
+            <a:avLst/>
+          </a:prstGeom>
+        </p:spPr>
+        <p:style>
+          <a:lnRef idx="2">
+            <a:schemeClr val="accent6">
+              <a:shade val="50000"/>
+            </a:schemeClr>
+          </a:lnRef>
+          <a:fillRef idx="1">
+            <a:schemeClr val="accent6"/>
+          </a:fillRef>
+          <a:effectRef idx="0">
+            <a:schemeClr val="accent6"/>
+          </a:effectRef>
+          <a:fontRef idx="minor">
+            <a:schemeClr val="lt1"/>
+          </a:fontRef>
+        </p:style>
+        <p:txBody>
+          <a:bodyPr anchor="ctr"/>
+          <a:lstStyle/>
+          <a:p>
+            <a:pPr algn="ctr" fontAlgn="auto">
+              <a:spcBef>
+                <a:spcPts val="0"/>
+              </a:spcBef>
+              <a:spcAft>
+                <a:spcPts val="0"/>
+              </a:spcAft>
+              <a:defRPr/>
+            </a:pPr>
+            <a:r>
+              <a:rPr lang="pt-PT" sz="1600" dirty="0" smtClean="0"/>
+              <a:t>Codif. De </a:t>
+            </a:r>
+            <a:r>
+              <a:rPr lang="pt-PT" sz="1600" dirty="0" smtClean="0"/>
+              <a:t>Correção de Erros</a:t>
+            </a:r>
+            <a:endParaRPr lang="pt-PT" sz="1600" dirty="0"/>
+          </a:p>
+        </p:txBody>
+      </p:sp>
+      <p:sp>
+        <p:nvSpPr>
+          <p:cNvPr id="57" name="Retângulo de cantos arredondados 56"/>
+          <p:cNvSpPr/>
+          <p:nvPr/>
+        </p:nvSpPr>
+        <p:spPr>
+          <a:xfrm>
+            <a:off x="9248539" y="4501035"/>
+            <a:ext cx="1790700" cy="425451"/>
+          </a:xfrm>
+          <a:prstGeom prst="roundRect">
+            <a:avLst/>
+          </a:prstGeom>
+        </p:spPr>
+        <p:style>
+          <a:lnRef idx="2">
+            <a:schemeClr val="accent6">
+              <a:shade val="50000"/>
+            </a:schemeClr>
+          </a:lnRef>
+          <a:fillRef idx="1">
+            <a:schemeClr val="accent6"/>
+          </a:fillRef>
+          <a:effectRef idx="0">
+            <a:schemeClr val="accent6"/>
+          </a:effectRef>
+          <a:fontRef idx="minor">
+            <a:schemeClr val="lt1"/>
+          </a:fontRef>
+        </p:style>
+        <p:txBody>
+          <a:bodyPr anchor="ctr"/>
+          <a:lstStyle/>
+          <a:p>
+            <a:pPr algn="ctr" fontAlgn="auto">
+              <a:spcBef>
+                <a:spcPts val="0"/>
+              </a:spcBef>
+              <a:spcAft>
+                <a:spcPts val="0"/>
+              </a:spcAft>
+              <a:defRPr/>
+            </a:pPr>
+            <a:r>
+              <a:rPr lang="pt-PT" dirty="0" smtClean="0"/>
+              <a:t>Modulador</a:t>
+            </a:r>
+            <a:endParaRPr lang="pt-PT" dirty="0"/>
+          </a:p>
+        </p:txBody>
+      </p:sp>
+      <p:sp>
+        <p:nvSpPr>
+          <p:cNvPr id="58" name="Retângulo de cantos arredondados 57"/>
+          <p:cNvSpPr/>
+          <p:nvPr/>
+        </p:nvSpPr>
+        <p:spPr>
+          <a:xfrm>
+            <a:off x="2694113" y="2932692"/>
+            <a:ext cx="1479011" cy="577851"/>
+          </a:xfrm>
+          <a:prstGeom prst="roundRect">
+            <a:avLst/>
+          </a:prstGeom>
+        </p:spPr>
+        <p:style>
+          <a:lnRef idx="2">
+            <a:schemeClr val="accent6">
+              <a:shade val="50000"/>
+            </a:schemeClr>
+          </a:lnRef>
+          <a:fillRef idx="1">
+            <a:schemeClr val="accent6"/>
+          </a:fillRef>
+          <a:effectRef idx="0">
+            <a:schemeClr val="accent6"/>
+          </a:effectRef>
+          <a:fontRef idx="minor">
+            <a:schemeClr val="lt1"/>
+          </a:fontRef>
+        </p:style>
+        <p:txBody>
+          <a:bodyPr anchor="ctr"/>
+          <a:lstStyle/>
+          <a:p>
+            <a:pPr algn="ctr" fontAlgn="auto">
+              <a:spcBef>
+                <a:spcPts val="0"/>
+              </a:spcBef>
+              <a:spcAft>
+                <a:spcPts val="0"/>
+              </a:spcAft>
+              <a:defRPr/>
+            </a:pPr>
+            <a:r>
+              <a:rPr lang="pt-PT" dirty="0" smtClean="0"/>
+              <a:t>Codificador de Video</a:t>
+            </a:r>
+            <a:endParaRPr lang="pt-PT" dirty="0"/>
+          </a:p>
+        </p:txBody>
+      </p:sp>
+      <p:sp>
+        <p:nvSpPr>
+          <p:cNvPr id="63" name="Retângulo de cantos arredondados 62"/>
+          <p:cNvSpPr/>
+          <p:nvPr/>
+        </p:nvSpPr>
+        <p:spPr>
+          <a:xfrm>
+            <a:off x="2668713" y="3661356"/>
+            <a:ext cx="1504411" cy="523875"/>
+          </a:xfrm>
+          <a:prstGeom prst="roundRect">
+            <a:avLst/>
+          </a:prstGeom>
+        </p:spPr>
+        <p:style>
+          <a:lnRef idx="2">
+            <a:schemeClr val="accent6">
+              <a:shade val="50000"/>
+            </a:schemeClr>
+          </a:lnRef>
+          <a:fillRef idx="1">
+            <a:schemeClr val="accent6"/>
+          </a:fillRef>
+          <a:effectRef idx="0">
+            <a:schemeClr val="accent6"/>
+          </a:effectRef>
+          <a:fontRef idx="minor">
+            <a:schemeClr val="lt1"/>
+          </a:fontRef>
+        </p:style>
+        <p:txBody>
+          <a:bodyPr anchor="ctr"/>
+          <a:lstStyle/>
+          <a:p>
+            <a:pPr algn="ctr" fontAlgn="auto">
+              <a:spcBef>
+                <a:spcPts val="0"/>
+              </a:spcBef>
+              <a:spcAft>
+                <a:spcPts val="0"/>
+              </a:spcAft>
+              <a:defRPr/>
+            </a:pPr>
+            <a:r>
+              <a:rPr lang="pt-PT" dirty="0"/>
+              <a:t>Codificador </a:t>
+            </a:r>
+            <a:r>
+              <a:rPr lang="pt-PT" dirty="0" smtClean="0"/>
+              <a:t>de Áudio</a:t>
+            </a:r>
+            <a:endParaRPr lang="pt-PT" dirty="0"/>
+          </a:p>
+        </p:txBody>
+      </p:sp>
+      <p:sp>
+        <p:nvSpPr>
+          <p:cNvPr id="64" name="Retângulo de cantos arredondados 63"/>
+          <p:cNvSpPr/>
+          <p:nvPr/>
+        </p:nvSpPr>
+        <p:spPr>
+          <a:xfrm>
+            <a:off x="2681413" y="4306658"/>
+            <a:ext cx="1479011" cy="577851"/>
+          </a:xfrm>
+          <a:prstGeom prst="roundRect">
+            <a:avLst/>
+          </a:prstGeom>
+        </p:spPr>
+        <p:style>
+          <a:lnRef idx="2">
+            <a:schemeClr val="accent6">
+              <a:shade val="50000"/>
+            </a:schemeClr>
+          </a:lnRef>
+          <a:fillRef idx="1">
+            <a:schemeClr val="accent6"/>
+          </a:fillRef>
+          <a:effectRef idx="0">
+            <a:schemeClr val="accent6"/>
+          </a:effectRef>
+          <a:fontRef idx="minor">
+            <a:schemeClr val="lt1"/>
+          </a:fontRef>
+        </p:style>
+        <p:txBody>
+          <a:bodyPr anchor="ctr"/>
+          <a:lstStyle/>
+          <a:p>
+            <a:pPr algn="ctr" fontAlgn="auto">
+              <a:spcBef>
+                <a:spcPts val="0"/>
+              </a:spcBef>
+              <a:spcAft>
+                <a:spcPts val="0"/>
+              </a:spcAft>
+              <a:defRPr/>
+            </a:pPr>
+            <a:r>
+              <a:rPr lang="pt-PT" dirty="0"/>
+              <a:t>Codificador de Video</a:t>
+            </a:r>
+            <a:endParaRPr lang="pt-PT" dirty="0"/>
+          </a:p>
+        </p:txBody>
+      </p:sp>
+      <p:sp>
+        <p:nvSpPr>
+          <p:cNvPr id="71" name="Retângulo de cantos arredondados 70"/>
+          <p:cNvSpPr/>
+          <p:nvPr/>
+        </p:nvSpPr>
+        <p:spPr>
+          <a:xfrm>
+            <a:off x="2656013" y="5035322"/>
+            <a:ext cx="1504411" cy="523875"/>
+          </a:xfrm>
+          <a:prstGeom prst="roundRect">
+            <a:avLst/>
+          </a:prstGeom>
+        </p:spPr>
+        <p:style>
+          <a:lnRef idx="2">
+            <a:schemeClr val="accent6">
+              <a:shade val="50000"/>
+            </a:schemeClr>
+          </a:lnRef>
+          <a:fillRef idx="1">
+            <a:schemeClr val="accent6"/>
+          </a:fillRef>
+          <a:effectRef idx="0">
+            <a:schemeClr val="accent6"/>
+          </a:effectRef>
+          <a:fontRef idx="minor">
+            <a:schemeClr val="lt1"/>
+          </a:fontRef>
+        </p:style>
+        <p:txBody>
+          <a:bodyPr anchor="ctr"/>
+          <a:lstStyle/>
+          <a:p>
+            <a:pPr algn="ctr" fontAlgn="auto">
+              <a:spcBef>
+                <a:spcPts val="0"/>
+              </a:spcBef>
+              <a:spcAft>
+                <a:spcPts val="0"/>
+              </a:spcAft>
+              <a:defRPr/>
+            </a:pPr>
+            <a:r>
+              <a:rPr lang="pt-PT" dirty="0"/>
+              <a:t>Codificador de Áudio</a:t>
+            </a:r>
+            <a:endParaRPr lang="pt-PT" dirty="0"/>
+          </a:p>
+        </p:txBody>
+      </p:sp>
     </p:spTree>
     <p:extLst>
       <p:ext uri="{BB962C8B-B14F-4D97-AF65-F5344CB8AC3E}">
@@ -15555,11 +16228,14 @@
               <a:defRPr/>
             </a:pPr>
             <a:r>
-              <a:rPr lang="pt-PT" sz="2000" dirty="0">
+              <a:rPr lang="pt-PT" sz="2000" dirty="0" smtClean="0">
                 <a:sym typeface="Symbol"/>
               </a:rPr>
-              <a:t>Packetizer</a:t>
-            </a:r>
+              <a:t>Packetizador</a:t>
+            </a:r>
+            <a:endParaRPr lang="pt-PT" sz="2000" dirty="0">
+              <a:sym typeface="Symbol"/>
+            </a:endParaRPr>
           </a:p>
         </p:txBody>
       </p:sp>
@@ -15608,11 +16284,14 @@
               <a:defRPr/>
             </a:pPr>
             <a:r>
-              <a:rPr lang="pt-PT" sz="2000" dirty="0">
+              <a:rPr lang="pt-PT" sz="2000" dirty="0" smtClean="0">
                 <a:sym typeface="Symbol"/>
               </a:rPr>
-              <a:t>Packetizer</a:t>
-            </a:r>
+              <a:t>Packetizador</a:t>
+            </a:r>
+            <a:endParaRPr lang="pt-PT" sz="2000" dirty="0">
+              <a:sym typeface="Symbol"/>
+            </a:endParaRPr>
           </a:p>
         </p:txBody>
       </p:sp>
@@ -15871,8 +16550,8 @@
         </p:nvSpPr>
         <p:spPr>
           <a:xfrm>
-            <a:off x="6896641" y="6077771"/>
-            <a:ext cx="2146300" cy="369332"/>
+            <a:off x="6896640" y="6077771"/>
+            <a:ext cx="2413001" cy="369332"/>
           </a:xfrm>
           <a:prstGeom prst="rect">
             <a:avLst/>
@@ -15889,8 +16568,11 @@
               <a:rPr lang="pt-PT" dirty="0" smtClean="0">
                 <a:latin typeface="Calibri" pitchFamily="34" charset="0"/>
               </a:rPr>
-              <a:t>MPEG2 Multiplexer</a:t>
-            </a:r>
+              <a:t>Multiplexador MPEG2</a:t>
+            </a:r>
+            <a:endParaRPr lang="pt-PT" dirty="0" smtClean="0">
+              <a:latin typeface="Calibri" pitchFamily="34" charset="0"/>
+            </a:endParaRPr>
           </a:p>
         </p:txBody>
       </p:sp>
@@ -15957,8 +16639,11 @@
               <a:rPr lang="pt-PT" dirty="0" smtClean="0">
                 <a:latin typeface="Calibri" pitchFamily="34" charset="0"/>
               </a:rPr>
-              <a:t>TS Packet</a:t>
-            </a:r>
+              <a:t>Pacote TS</a:t>
+            </a:r>
+            <a:endParaRPr lang="pt-PT" dirty="0" smtClean="0">
+              <a:latin typeface="Calibri" pitchFamily="34" charset="0"/>
+            </a:endParaRPr>
           </a:p>
         </p:txBody>
       </p:sp>
@@ -16649,7 +17334,7 @@
         <p:spPr>
           <a:xfrm>
             <a:off x="7964546" y="6210302"/>
-            <a:ext cx="2377109" cy="369332"/>
+            <a:ext cx="2669206" cy="369332"/>
           </a:xfrm>
           <a:prstGeom prst="rect">
             <a:avLst/>
@@ -16663,11 +17348,20 @@
           <a:lstStyle/>
           <a:p>
             <a:r>
+              <a:rPr lang="pt-PT" dirty="0">
+                <a:latin typeface="Calibri" pitchFamily="34" charset="0"/>
+              </a:rPr>
+              <a:t>Demultiplexador </a:t>
+            </a:r>
+            <a:r>
               <a:rPr lang="pt-PT" dirty="0" smtClean="0">
                 <a:latin typeface="Calibri" pitchFamily="34" charset="0"/>
               </a:rPr>
-              <a:t>MPEG2 Demultiplexer</a:t>
-            </a:r>
+              <a:t>MPEG2</a:t>
+            </a:r>
+            <a:endParaRPr lang="pt-PT" dirty="0" smtClean="0">
+              <a:latin typeface="Calibri" pitchFamily="34" charset="0"/>
+            </a:endParaRPr>
           </a:p>
         </p:txBody>
       </p:sp>
@@ -18481,28 +19175,37 @@
               <a:defRPr/>
             </a:pPr>
             <a:r>
+              <a:rPr lang="pt-PT" sz="2000" dirty="0" smtClean="0">
+                <a:sym typeface="Symbol"/>
+              </a:rPr>
+              <a:t>Packetizador</a:t>
+            </a:r>
+          </a:p>
+          <a:p>
+            <a:pPr algn="ctr" fontAlgn="auto">
+              <a:spcBef>
+                <a:spcPts val="0"/>
+              </a:spcBef>
+              <a:spcAft>
+                <a:spcPts val="0"/>
+              </a:spcAft>
+              <a:defRPr/>
+            </a:pPr>
+            <a:r>
+              <a:rPr lang="pt-PT" sz="2000" dirty="0" smtClean="0">
+                <a:sym typeface="Symbol"/>
+              </a:rPr>
+              <a:t>De </a:t>
+            </a:r>
+            <a:r>
               <a:rPr lang="pt-PT" sz="2000" dirty="0">
                 <a:sym typeface="Symbol"/>
               </a:rPr>
               <a:t>Video</a:t>
             </a:r>
-          </a:p>
-          <a:p>
-            <a:pPr algn="ctr" fontAlgn="auto">
-              <a:spcBef>
-                <a:spcPts val="0"/>
-              </a:spcBef>
-              <a:spcAft>
-                <a:spcPts val="0"/>
-              </a:spcAft>
-              <a:defRPr/>
-            </a:pPr>
-            <a:r>
-              <a:rPr lang="pt-PT" sz="2000" dirty="0">
-                <a:sym typeface="Symbol"/>
-              </a:rPr>
-              <a:t>Packetizer</a:t>
-            </a:r>
+            <a:endParaRPr lang="pt-PT" sz="2000" dirty="0">
+              <a:sym typeface="Symbol"/>
+            </a:endParaRPr>
           </a:p>
         </p:txBody>
       </p:sp>
@@ -18551,10 +19254,10 @@
               <a:defRPr/>
             </a:pPr>
             <a:r>
-              <a:rPr lang="pt-PT" sz="2000" dirty="0">
+              <a:rPr lang="pt-PT" sz="2000" dirty="0" smtClean="0">
                 <a:sym typeface="Symbol"/>
               </a:rPr>
-              <a:t>Audio</a:t>
+              <a:t>Packetizador</a:t>
             </a:r>
           </a:p>
           <a:p>
@@ -18568,11 +19271,14 @@
               <a:defRPr/>
             </a:pPr>
             <a:r>
-              <a:rPr lang="pt-PT" sz="2000" dirty="0">
+              <a:rPr lang="pt-PT" sz="2000" dirty="0" smtClean="0">
                 <a:sym typeface="Symbol"/>
               </a:rPr>
-              <a:t>Packetizer</a:t>
-            </a:r>
+              <a:t>De Audio</a:t>
+            </a:r>
+            <a:endParaRPr lang="pt-PT" sz="2000" dirty="0">
+              <a:sym typeface="Symbol"/>
+            </a:endParaRPr>
           </a:p>
         </p:txBody>
       </p:sp>
@@ -18788,8 +19494,8 @@
         </p:nvSpPr>
         <p:spPr>
           <a:xfrm>
-            <a:off x="8420637" y="6210302"/>
-            <a:ext cx="2146300" cy="369332"/>
+            <a:off x="8127104" y="6210302"/>
+            <a:ext cx="2439833" cy="369332"/>
           </a:xfrm>
           <a:prstGeom prst="rect">
             <a:avLst/>
@@ -18803,11 +19509,20 @@
           <a:lstStyle/>
           <a:p>
             <a:r>
+              <a:rPr lang="pt-PT" dirty="0">
+                <a:latin typeface="Calibri" pitchFamily="34" charset="0"/>
+              </a:rPr>
+              <a:t>Multiplexador </a:t>
+            </a:r>
+            <a:r>
               <a:rPr lang="pt-PT" dirty="0" smtClean="0">
                 <a:latin typeface="Calibri" pitchFamily="34" charset="0"/>
               </a:rPr>
-              <a:t>MPEG2 Multiplexer</a:t>
-            </a:r>
+              <a:t>MPEG2</a:t>
+            </a:r>
+            <a:endParaRPr lang="pt-PT" dirty="0" smtClean="0">
+              <a:latin typeface="Calibri" pitchFamily="34" charset="0"/>
+            </a:endParaRPr>
           </a:p>
         </p:txBody>
       </p:sp>
@@ -18877,8 +19592,11 @@
               <a:rPr lang="pt-PT" dirty="0" smtClean="0">
                 <a:latin typeface="Calibri" pitchFamily="34" charset="0"/>
               </a:rPr>
-              <a:t>TS Packets</a:t>
-            </a:r>
+              <a:t>Pacotes TS </a:t>
+            </a:r>
+            <a:endParaRPr lang="pt-PT" dirty="0" smtClean="0">
+              <a:latin typeface="Calibri" pitchFamily="34" charset="0"/>
+            </a:endParaRPr>
           </a:p>
         </p:txBody>
       </p:sp>
@@ -19389,8 +20107,11 @@
               <a:rPr lang="pt-PT" dirty="0" smtClean="0">
                 <a:latin typeface="Calibri" pitchFamily="34" charset="0"/>
               </a:rPr>
-              <a:t>PES Packet</a:t>
-            </a:r>
+              <a:t>Pacote PES</a:t>
+            </a:r>
+            <a:endParaRPr lang="pt-PT" dirty="0" smtClean="0">
+              <a:latin typeface="Calibri" pitchFamily="34" charset="0"/>
+            </a:endParaRPr>
           </a:p>
         </p:txBody>
       </p:sp>
@@ -20532,7 +21253,7 @@
               <a:rPr lang="pt-BR" sz="2000" dirty="0" smtClean="0">
                 <a:latin typeface="Calibri" pitchFamily="34" charset="0"/>
               </a:rPr>
-              <a:t>Alcance – Modulações diferentes</a:t>
+              <a:t>Alcance – modulações diferentes</a:t>
             </a:r>
             <a:endParaRPr lang="pt-BR" sz="2000" dirty="0">
               <a:latin typeface="Calibri" pitchFamily="34" charset="0"/>
@@ -23581,7 +24302,14 @@
                 <a:latin typeface="Calibri" pitchFamily="34" charset="0"/>
                 <a:sym typeface="Wingdings" pitchFamily="2" charset="2"/>
               </a:rPr>
-              <a:t>mesmo buffer</a:t>
+              <a:t>mesmo </a:t>
+            </a:r>
+            <a:r>
+              <a:rPr lang="pt-PT" sz="2400" i="1" dirty="0">
+                <a:latin typeface="Calibri" pitchFamily="34" charset="0"/>
+                <a:sym typeface="Wingdings" pitchFamily="2" charset="2"/>
+              </a:rPr>
+              <a:t>buffer</a:t>
             </a:r>
           </a:p>
           <a:p>
@@ -23642,7 +24370,21 @@
                 <a:latin typeface="Calibri" pitchFamily="34" charset="0"/>
                 <a:sym typeface="Wingdings" pitchFamily="2" charset="2"/>
               </a:rPr>
-              <a:t>o buffer para a saída</a:t>
+              <a:t>o </a:t>
+            </a:r>
+            <a:r>
+              <a:rPr lang="pt-PT" sz="2400" i="1" dirty="0">
+                <a:latin typeface="Calibri" pitchFamily="34" charset="0"/>
+                <a:sym typeface="Wingdings" pitchFamily="2" charset="2"/>
+              </a:rPr>
+              <a:t>buffer</a:t>
+            </a:r>
+            <a:r>
+              <a:rPr lang="pt-PT" sz="2400" dirty="0">
+                <a:latin typeface="Calibri" pitchFamily="34" charset="0"/>
+                <a:sym typeface="Wingdings" pitchFamily="2" charset="2"/>
+              </a:rPr>
+              <a:t> para a saída</a:t>
             </a:r>
           </a:p>
           <a:p>
@@ -25713,19 +26455,15 @@
           <a:p>
             <a:pPr lvl="1"/>
             <a:r>
+              <a:rPr lang="pt-PT" dirty="0"/>
+              <a:t>Entretenimento</a:t>
+            </a:r>
+          </a:p>
+          <a:p>
+            <a:pPr lvl="1"/>
+            <a:r>
               <a:rPr lang="pt-PT" dirty="0" smtClean="0"/>
-              <a:t>Informação </a:t>
-            </a:r>
-            <a:r>
-              <a:rPr lang="pt-PT" dirty="0" smtClean="0"/>
-              <a:t>Atualizada</a:t>
-            </a:r>
-          </a:p>
-          <a:p>
-            <a:pPr lvl="1"/>
-            <a:r>
-              <a:rPr lang="pt-PT" dirty="0" smtClean="0"/>
-              <a:t>Entretenimento</a:t>
+              <a:t>Informação atualizada</a:t>
             </a:r>
             <a:endParaRPr lang="pt-PT" dirty="0" smtClean="0"/>
           </a:p>
@@ -25736,9 +26474,22 @@
               <a:t>Formação </a:t>
             </a:r>
             <a:r>
+              <a:rPr lang="pt-PT" dirty="0"/>
+              <a:t>c</a:t>
+            </a:r>
+            <a:r>
               <a:rPr lang="pt-PT" dirty="0" smtClean="0"/>
-              <a:t>Cultural e Educacional</a:t>
-            </a:r>
+              <a:t>ultural </a:t>
+            </a:r>
+            <a:r>
+              <a:rPr lang="pt-PT" dirty="0" smtClean="0"/>
+              <a:t>e </a:t>
+            </a:r>
+            <a:r>
+              <a:rPr lang="pt-PT" dirty="0" smtClean="0"/>
+              <a:t>educacional</a:t>
+            </a:r>
+            <a:endParaRPr lang="pt-PT" dirty="0" smtClean="0"/>
           </a:p>
           <a:p>
             <a:r>
@@ -32653,16 +33404,36 @@
               <a:t>Inclusão </a:t>
             </a:r>
             <a:r>
+              <a:rPr lang="pt-BR" dirty="0" smtClean="0"/>
+              <a:t>social </a:t>
+            </a:r>
+            <a:r>
               <a:rPr lang="pt-BR" dirty="0"/>
-              <a:t>Social pela </a:t>
+              <a:t>pela </a:t>
             </a:r>
             <a:r>
               <a:rPr lang="pt-BR" dirty="0" smtClean="0"/>
-              <a:t>Interatividade, </a:t>
+              <a:t>interatividade</a:t>
+            </a:r>
+            <a:r>
+              <a:rPr lang="pt-BR" dirty="0" smtClean="0"/>
+              <a:t>, </a:t>
             </a:r>
             <a:r>
               <a:rPr lang="pt-BR" sz="2000" dirty="0" smtClean="0"/>
-              <a:t>que depende de um canal de retorno</a:t>
+              <a:t>que depende </a:t>
+            </a:r>
+            <a:r>
+              <a:rPr lang="pt-BR" sz="2000" dirty="0" smtClean="0"/>
+              <a:t>do canal </a:t>
+            </a:r>
+            <a:r>
+              <a:rPr lang="pt-BR" sz="2000" dirty="0" smtClean="0"/>
+              <a:t>de </a:t>
+            </a:r>
+            <a:r>
+              <a:rPr lang="pt-BR" sz="2000" dirty="0" smtClean="0"/>
+              <a:t>retorno ainda indefinido</a:t>
             </a:r>
             <a:endParaRPr lang="pt-BR" dirty="0"/>
           </a:p>
@@ -35099,9 +35870,14 @@
               <a:defRPr/>
             </a:pPr>
             <a:r>
-              <a:rPr lang="pt-PT" dirty="0"/>
-              <a:t>Error Correction Encoder</a:t>
-            </a:r>
+              <a:rPr lang="pt-PT" sz="1600" dirty="0" smtClean="0"/>
+              <a:t>Codif. De </a:t>
+            </a:r>
+            <a:r>
+              <a:rPr lang="pt-PT" sz="1600" dirty="0" smtClean="0"/>
+              <a:t>Correção de Erros</a:t>
+            </a:r>
+            <a:endParaRPr lang="pt-PT" sz="1600" dirty="0"/>
           </a:p>
         </p:txBody>
       </p:sp>
@@ -35150,9 +35926,10 @@
               <a:defRPr/>
             </a:pPr>
             <a:r>
-              <a:rPr lang="pt-PT" dirty="0"/>
-              <a:t>Modulator</a:t>
-            </a:r>
+              <a:rPr lang="pt-PT" dirty="0" smtClean="0"/>
+              <a:t>Modulador</a:t>
+            </a:r>
+            <a:endParaRPr lang="pt-PT" dirty="0"/>
           </a:p>
         </p:txBody>
       </p:sp>
@@ -35550,9 +36327,10 @@
               <a:defRPr/>
             </a:pPr>
             <a:r>
-              <a:rPr lang="pt-PT" dirty="0"/>
-              <a:t>Video Encoder</a:t>
-            </a:r>
+              <a:rPr lang="pt-PT" dirty="0" smtClean="0"/>
+              <a:t>Codificador de Video</a:t>
+            </a:r>
+            <a:endParaRPr lang="pt-PT" dirty="0"/>
           </a:p>
         </p:txBody>
       </p:sp>
@@ -35638,8 +36416,13 @@
             </a:pPr>
             <a:r>
               <a:rPr lang="pt-PT" dirty="0"/>
-              <a:t>Audio Encoder</a:t>
-            </a:r>
+              <a:t>Codificador </a:t>
+            </a:r>
+            <a:r>
+              <a:rPr lang="pt-PT" dirty="0" smtClean="0"/>
+              <a:t>de Áudio</a:t>
+            </a:r>
+            <a:endParaRPr lang="pt-PT" dirty="0"/>
           </a:p>
         </p:txBody>
       </p:sp>
@@ -36004,8 +36787,9 @@
             </a:pPr>
             <a:r>
               <a:rPr lang="pt-PT" dirty="0"/>
-              <a:t>Video Encoder</a:t>
-            </a:r>
+              <a:t>Codificador de Video</a:t>
+            </a:r>
+            <a:endParaRPr lang="pt-PT" dirty="0"/>
           </a:p>
         </p:txBody>
       </p:sp>
@@ -36091,8 +36875,9 @@
             </a:pPr>
             <a:r>
               <a:rPr lang="pt-PT" dirty="0"/>
-              <a:t>Audio Encoder</a:t>
-            </a:r>
+              <a:t>Codificador de Áudio</a:t>
+            </a:r>
+            <a:endParaRPr lang="pt-PT" dirty="0"/>
           </a:p>
         </p:txBody>
       </p:sp>
@@ -36642,11 +37427,7 @@
             </a:pPr>
             <a:r>
               <a:rPr lang="pt-PT" dirty="0"/>
-              <a:t>MPEG2 </a:t>
-            </a:r>
-            <a:r>
-              <a:rPr lang="pt-PT" dirty="0" smtClean="0"/>
-              <a:t>Multiplexer</a:t>
+              <a:t>Multiplexador MPEG2 </a:t>
             </a:r>
             <a:endParaRPr lang="pt-PT" dirty="0"/>
           </a:p>
@@ -38610,11 +39391,11 @@
             </a:pPr>
             <a:r>
               <a:rPr lang="pt-PT" dirty="0"/>
-              <a:t>MPEG2 </a:t>
+              <a:t>Multiplexador </a:t>
             </a:r>
             <a:r>
               <a:rPr lang="pt-PT" dirty="0" smtClean="0"/>
-              <a:t>Multiplexer</a:t>
+              <a:t>MPEG2</a:t>
             </a:r>
             <a:endParaRPr lang="pt-PT" dirty="0"/>
           </a:p>
@@ -38764,6 +39545,326 @@
             <a:endParaRPr lang="pt-BR" dirty="0">
               <a:latin typeface="Calibri" pitchFamily="34" charset="0"/>
             </a:endParaRPr>
+          </a:p>
+        </p:txBody>
+      </p:sp>
+      <p:sp>
+        <p:nvSpPr>
+          <p:cNvPr id="49" name="Retângulo de cantos arredondados 48"/>
+          <p:cNvSpPr/>
+          <p:nvPr/>
+        </p:nvSpPr>
+        <p:spPr>
+          <a:xfrm>
+            <a:off x="9231017" y="5292851"/>
+            <a:ext cx="1790700" cy="577851"/>
+          </a:xfrm>
+          <a:prstGeom prst="roundRect">
+            <a:avLst/>
+          </a:prstGeom>
+        </p:spPr>
+        <p:style>
+          <a:lnRef idx="2">
+            <a:schemeClr val="accent6">
+              <a:shade val="50000"/>
+            </a:schemeClr>
+          </a:lnRef>
+          <a:fillRef idx="1">
+            <a:schemeClr val="accent6"/>
+          </a:fillRef>
+          <a:effectRef idx="0">
+            <a:schemeClr val="accent6"/>
+          </a:effectRef>
+          <a:fontRef idx="minor">
+            <a:schemeClr val="lt1"/>
+          </a:fontRef>
+        </p:style>
+        <p:txBody>
+          <a:bodyPr anchor="ctr"/>
+          <a:lstStyle/>
+          <a:p>
+            <a:pPr algn="ctr" fontAlgn="auto">
+              <a:spcBef>
+                <a:spcPts val="0"/>
+              </a:spcBef>
+              <a:spcAft>
+                <a:spcPts val="0"/>
+              </a:spcAft>
+              <a:defRPr/>
+            </a:pPr>
+            <a:r>
+              <a:rPr lang="pt-PT" sz="1600" dirty="0" smtClean="0"/>
+              <a:t>Codif. De </a:t>
+            </a:r>
+            <a:r>
+              <a:rPr lang="pt-PT" sz="1600" dirty="0" smtClean="0"/>
+              <a:t>Correção de Erros</a:t>
+            </a:r>
+            <a:endParaRPr lang="pt-PT" sz="1600" dirty="0"/>
+          </a:p>
+        </p:txBody>
+      </p:sp>
+      <p:sp>
+        <p:nvSpPr>
+          <p:cNvPr id="50" name="Retângulo de cantos arredondados 49"/>
+          <p:cNvSpPr/>
+          <p:nvPr/>
+        </p:nvSpPr>
+        <p:spPr>
+          <a:xfrm>
+            <a:off x="9229879" y="4519698"/>
+            <a:ext cx="1790700" cy="425451"/>
+          </a:xfrm>
+          <a:prstGeom prst="roundRect">
+            <a:avLst/>
+          </a:prstGeom>
+        </p:spPr>
+        <p:style>
+          <a:lnRef idx="2">
+            <a:schemeClr val="accent6">
+              <a:shade val="50000"/>
+            </a:schemeClr>
+          </a:lnRef>
+          <a:fillRef idx="1">
+            <a:schemeClr val="accent6"/>
+          </a:fillRef>
+          <a:effectRef idx="0">
+            <a:schemeClr val="accent6"/>
+          </a:effectRef>
+          <a:fontRef idx="minor">
+            <a:schemeClr val="lt1"/>
+          </a:fontRef>
+        </p:style>
+        <p:txBody>
+          <a:bodyPr anchor="ctr"/>
+          <a:lstStyle/>
+          <a:p>
+            <a:pPr algn="ctr" fontAlgn="auto">
+              <a:spcBef>
+                <a:spcPts val="0"/>
+              </a:spcBef>
+              <a:spcAft>
+                <a:spcPts val="0"/>
+              </a:spcAft>
+              <a:defRPr/>
+            </a:pPr>
+            <a:r>
+              <a:rPr lang="pt-PT" dirty="0" smtClean="0"/>
+              <a:t>Modulador</a:t>
+            </a:r>
+            <a:endParaRPr lang="pt-PT" dirty="0"/>
+          </a:p>
+        </p:txBody>
+      </p:sp>
+      <p:sp>
+        <p:nvSpPr>
+          <p:cNvPr id="51" name="Retângulo de cantos arredondados 50"/>
+          <p:cNvSpPr/>
+          <p:nvPr/>
+        </p:nvSpPr>
+        <p:spPr>
+          <a:xfrm>
+            <a:off x="2675453" y="2951355"/>
+            <a:ext cx="1479011" cy="577851"/>
+          </a:xfrm>
+          <a:prstGeom prst="roundRect">
+            <a:avLst/>
+          </a:prstGeom>
+        </p:spPr>
+        <p:style>
+          <a:lnRef idx="2">
+            <a:schemeClr val="accent6">
+              <a:shade val="50000"/>
+            </a:schemeClr>
+          </a:lnRef>
+          <a:fillRef idx="1">
+            <a:schemeClr val="accent6"/>
+          </a:fillRef>
+          <a:effectRef idx="0">
+            <a:schemeClr val="accent6"/>
+          </a:effectRef>
+          <a:fontRef idx="minor">
+            <a:schemeClr val="lt1"/>
+          </a:fontRef>
+        </p:style>
+        <p:txBody>
+          <a:bodyPr anchor="ctr"/>
+          <a:lstStyle/>
+          <a:p>
+            <a:pPr algn="ctr" fontAlgn="auto">
+              <a:spcBef>
+                <a:spcPts val="0"/>
+              </a:spcBef>
+              <a:spcAft>
+                <a:spcPts val="0"/>
+              </a:spcAft>
+              <a:defRPr/>
+            </a:pPr>
+            <a:r>
+              <a:rPr lang="pt-PT" dirty="0" smtClean="0"/>
+              <a:t>Codificador de Video</a:t>
+            </a:r>
+            <a:endParaRPr lang="pt-PT" dirty="0"/>
+          </a:p>
+        </p:txBody>
+      </p:sp>
+      <p:sp>
+        <p:nvSpPr>
+          <p:cNvPr id="52" name="Retângulo de cantos arredondados 51"/>
+          <p:cNvSpPr/>
+          <p:nvPr/>
+        </p:nvSpPr>
+        <p:spPr>
+          <a:xfrm>
+            <a:off x="2650053" y="3680019"/>
+            <a:ext cx="1504411" cy="523875"/>
+          </a:xfrm>
+          <a:prstGeom prst="roundRect">
+            <a:avLst/>
+          </a:prstGeom>
+        </p:spPr>
+        <p:style>
+          <a:lnRef idx="2">
+            <a:schemeClr val="accent6">
+              <a:shade val="50000"/>
+            </a:schemeClr>
+          </a:lnRef>
+          <a:fillRef idx="1">
+            <a:schemeClr val="accent6"/>
+          </a:fillRef>
+          <a:effectRef idx="0">
+            <a:schemeClr val="accent6"/>
+          </a:effectRef>
+          <a:fontRef idx="minor">
+            <a:schemeClr val="lt1"/>
+          </a:fontRef>
+        </p:style>
+        <p:txBody>
+          <a:bodyPr anchor="ctr"/>
+          <a:lstStyle/>
+          <a:p>
+            <a:pPr algn="ctr" fontAlgn="auto">
+              <a:spcBef>
+                <a:spcPts val="0"/>
+              </a:spcBef>
+              <a:spcAft>
+                <a:spcPts val="0"/>
+              </a:spcAft>
+              <a:defRPr/>
+            </a:pPr>
+            <a:r>
+              <a:rPr lang="pt-PT" dirty="0"/>
+              <a:t>Codificador </a:t>
+            </a:r>
+            <a:r>
+              <a:rPr lang="pt-PT" dirty="0" smtClean="0"/>
+              <a:t>de Áudio</a:t>
+            </a:r>
+            <a:endParaRPr lang="pt-PT" dirty="0"/>
+          </a:p>
+        </p:txBody>
+      </p:sp>
+      <p:sp>
+        <p:nvSpPr>
+          <p:cNvPr id="53" name="Retângulo de cantos arredondados 52"/>
+          <p:cNvSpPr/>
+          <p:nvPr/>
+        </p:nvSpPr>
+        <p:spPr>
+          <a:xfrm>
+            <a:off x="2662753" y="4325321"/>
+            <a:ext cx="1479011" cy="577851"/>
+          </a:xfrm>
+          <a:prstGeom prst="roundRect">
+            <a:avLst/>
+          </a:prstGeom>
+        </p:spPr>
+        <p:style>
+          <a:lnRef idx="2">
+            <a:schemeClr val="accent6">
+              <a:shade val="50000"/>
+            </a:schemeClr>
+          </a:lnRef>
+          <a:fillRef idx="1">
+            <a:schemeClr val="accent6"/>
+          </a:fillRef>
+          <a:effectRef idx="0">
+            <a:schemeClr val="accent6"/>
+          </a:effectRef>
+          <a:fontRef idx="minor">
+            <a:schemeClr val="lt1"/>
+          </a:fontRef>
+        </p:style>
+        <p:txBody>
+          <a:bodyPr anchor="ctr"/>
+          <a:lstStyle/>
+          <a:p>
+            <a:pPr algn="ctr" fontAlgn="auto">
+              <a:spcBef>
+                <a:spcPts val="0"/>
+              </a:spcBef>
+              <a:spcAft>
+                <a:spcPts val="0"/>
+              </a:spcAft>
+              <a:defRPr/>
+            </a:pPr>
+            <a:r>
+              <a:rPr lang="pt-PT" dirty="0"/>
+              <a:t>Codificador de Video</a:t>
+            </a:r>
+            <a:endParaRPr lang="pt-PT" dirty="0"/>
+          </a:p>
+        </p:txBody>
+      </p:sp>
+      <p:sp>
+        <p:nvSpPr>
+          <p:cNvPr id="54" name="Retângulo de cantos arredondados 53"/>
+          <p:cNvSpPr/>
+          <p:nvPr/>
+        </p:nvSpPr>
+        <p:spPr>
+          <a:xfrm>
+            <a:off x="2637353" y="5053985"/>
+            <a:ext cx="1504411" cy="523875"/>
+          </a:xfrm>
+          <a:prstGeom prst="roundRect">
+            <a:avLst/>
+          </a:prstGeom>
+        </p:spPr>
+        <p:style>
+          <a:lnRef idx="2">
+            <a:schemeClr val="accent6">
+              <a:shade val="50000"/>
+            </a:schemeClr>
+          </a:lnRef>
+          <a:fillRef idx="1">
+            <a:schemeClr val="accent6"/>
+          </a:fillRef>
+          <a:effectRef idx="0">
+            <a:schemeClr val="accent6"/>
+          </a:effectRef>
+          <a:fontRef idx="minor">
+            <a:schemeClr val="lt1"/>
+          </a:fontRef>
+        </p:style>
+        <p:txBody>
+          <a:bodyPr anchor="ctr"/>
+          <a:lstStyle/>
+          <a:p>
+            <a:pPr algn="ctr" fontAlgn="auto">
+              <a:spcBef>
+                <a:spcPts val="0"/>
+              </a:spcBef>
+              <a:spcAft>
+                <a:spcPts val="0"/>
+              </a:spcAft>
+              <a:defRPr/>
+            </a:pPr>
+            <a:r>
+              <a:rPr lang="pt-PT" dirty="0"/>
+              <a:t>Codificador de Áudio</a:t>
+            </a:r>
+            <a:endParaRPr lang="pt-PT" dirty="0"/>
           </a:p>
         </p:txBody>
       </p:sp>
@@ -40896,7 +41997,7 @@
                   <a:srgbClr val="002060"/>
                 </a:solidFill>
               </a:rPr>
-              <a:t>MPEG2 Multiplexer</a:t>
+              <a:t>Multiplexador MPEG2</a:t>
             </a:r>
             <a:endParaRPr lang="pt-PT" dirty="0">
               <a:solidFill>
@@ -41273,14 +42374,66 @@
       </p:sp>
       <p:sp>
         <p:nvSpPr>
-          <p:cNvPr id="128" name="Retângulo de cantos arredondados 127"/>
+          <p:cNvPr id="130" name="CaixaDeTexto 28"/>
+          <p:cNvSpPr txBox="1">
+            <a:spLocks noChangeArrowheads="1"/>
+          </p:cNvSpPr>
+          <p:nvPr/>
+        </p:nvSpPr>
+        <p:spPr bwMode="auto">
+          <a:xfrm>
+            <a:off x="5904408" y="2231820"/>
+            <a:ext cx="1357529" cy="1200329"/>
+          </a:xfrm>
+          <a:prstGeom prst="rect">
+            <a:avLst/>
+          </a:prstGeom>
+          <a:noFill/>
+          <a:ln w="9525">
+            <a:noFill/>
+            <a:miter lim="800000"/>
+            <a:headEnd/>
+            <a:tailEnd/>
+          </a:ln>
+        </p:spPr>
+        <p:txBody>
+          <a:bodyPr wrap="square">
+            <a:spAutoFit/>
+          </a:bodyPr>
+          <a:lstStyle/>
+          <a:p>
+            <a:pPr algn="ctr"/>
+            <a:r>
+              <a:rPr lang="pt-PT" dirty="0" smtClean="0">
+                <a:latin typeface="Calibri" pitchFamily="34" charset="0"/>
+              </a:rPr>
+              <a:t>Single Service</a:t>
+            </a:r>
+          </a:p>
+          <a:p>
+            <a:pPr algn="ctr"/>
+            <a:r>
+              <a:rPr lang="pt-PT" dirty="0" smtClean="0">
+                <a:latin typeface="Calibri" pitchFamily="34" charset="0"/>
+              </a:rPr>
+              <a:t>Transport Stream</a:t>
+            </a:r>
+            <a:endParaRPr lang="pt-BR" dirty="0">
+              <a:latin typeface="Calibri" pitchFamily="34" charset="0"/>
+            </a:endParaRPr>
+          </a:p>
+        </p:txBody>
+      </p:sp>
+      <p:sp>
+        <p:nvSpPr>
+          <p:cNvPr id="131" name="Retângulo de cantos arredondados 130"/>
           <p:cNvSpPr/>
           <p:nvPr/>
         </p:nvSpPr>
         <p:spPr>
           <a:xfrm>
-            <a:off x="3971576" y="2109531"/>
-            <a:ext cx="1134399" cy="3427625"/>
+            <a:off x="6015974" y="2296544"/>
+            <a:ext cx="1134399" cy="2550736"/>
           </a:xfrm>
           <a:prstGeom prst="roundRect">
             <a:avLst/>
@@ -41325,14 +42478,334 @@
       </p:sp>
       <p:sp>
         <p:nvSpPr>
-          <p:cNvPr id="129" name="Retângulo de cantos arredondados 128"/>
+          <p:cNvPr id="57" name="Retângulo de cantos arredondados 56"/>
           <p:cNvSpPr/>
           <p:nvPr/>
         </p:nvSpPr>
         <p:spPr>
           <a:xfrm>
-            <a:off x="8348870" y="2874948"/>
-            <a:ext cx="1134399" cy="2842033"/>
+            <a:off x="9249677" y="5274188"/>
+            <a:ext cx="1790700" cy="577851"/>
+          </a:xfrm>
+          <a:prstGeom prst="roundRect">
+            <a:avLst/>
+          </a:prstGeom>
+        </p:spPr>
+        <p:style>
+          <a:lnRef idx="2">
+            <a:schemeClr val="accent6">
+              <a:shade val="50000"/>
+            </a:schemeClr>
+          </a:lnRef>
+          <a:fillRef idx="1">
+            <a:schemeClr val="accent6"/>
+          </a:fillRef>
+          <a:effectRef idx="0">
+            <a:schemeClr val="accent6"/>
+          </a:effectRef>
+          <a:fontRef idx="minor">
+            <a:schemeClr val="lt1"/>
+          </a:fontRef>
+        </p:style>
+        <p:txBody>
+          <a:bodyPr anchor="ctr"/>
+          <a:lstStyle/>
+          <a:p>
+            <a:pPr algn="ctr" fontAlgn="auto">
+              <a:spcBef>
+                <a:spcPts val="0"/>
+              </a:spcBef>
+              <a:spcAft>
+                <a:spcPts val="0"/>
+              </a:spcAft>
+              <a:defRPr/>
+            </a:pPr>
+            <a:r>
+              <a:rPr lang="pt-PT" sz="1600" dirty="0" smtClean="0"/>
+              <a:t>Codif. De </a:t>
+            </a:r>
+            <a:r>
+              <a:rPr lang="pt-PT" sz="1600" dirty="0" smtClean="0"/>
+              <a:t>Correção de Erros</a:t>
+            </a:r>
+            <a:endParaRPr lang="pt-PT" sz="1600" dirty="0"/>
+          </a:p>
+        </p:txBody>
+      </p:sp>
+      <p:sp>
+        <p:nvSpPr>
+          <p:cNvPr id="58" name="Retângulo de cantos arredondados 57"/>
+          <p:cNvSpPr/>
+          <p:nvPr/>
+        </p:nvSpPr>
+        <p:spPr>
+          <a:xfrm>
+            <a:off x="9248539" y="4501035"/>
+            <a:ext cx="1790700" cy="425451"/>
+          </a:xfrm>
+          <a:prstGeom prst="roundRect">
+            <a:avLst/>
+          </a:prstGeom>
+        </p:spPr>
+        <p:style>
+          <a:lnRef idx="2">
+            <a:schemeClr val="accent6">
+              <a:shade val="50000"/>
+            </a:schemeClr>
+          </a:lnRef>
+          <a:fillRef idx="1">
+            <a:schemeClr val="accent6"/>
+          </a:fillRef>
+          <a:effectRef idx="0">
+            <a:schemeClr val="accent6"/>
+          </a:effectRef>
+          <a:fontRef idx="minor">
+            <a:schemeClr val="lt1"/>
+          </a:fontRef>
+        </p:style>
+        <p:txBody>
+          <a:bodyPr anchor="ctr"/>
+          <a:lstStyle/>
+          <a:p>
+            <a:pPr algn="ctr" fontAlgn="auto">
+              <a:spcBef>
+                <a:spcPts val="0"/>
+              </a:spcBef>
+              <a:spcAft>
+                <a:spcPts val="0"/>
+              </a:spcAft>
+              <a:defRPr/>
+            </a:pPr>
+            <a:r>
+              <a:rPr lang="pt-PT" dirty="0" smtClean="0"/>
+              <a:t>Modulador</a:t>
+            </a:r>
+            <a:endParaRPr lang="pt-PT" dirty="0"/>
+          </a:p>
+        </p:txBody>
+      </p:sp>
+      <p:sp>
+        <p:nvSpPr>
+          <p:cNvPr id="59" name="Retângulo de cantos arredondados 58"/>
+          <p:cNvSpPr/>
+          <p:nvPr/>
+        </p:nvSpPr>
+        <p:spPr>
+          <a:xfrm>
+            <a:off x="2694113" y="2932692"/>
+            <a:ext cx="1479011" cy="577851"/>
+          </a:xfrm>
+          <a:prstGeom prst="roundRect">
+            <a:avLst/>
+          </a:prstGeom>
+        </p:spPr>
+        <p:style>
+          <a:lnRef idx="2">
+            <a:schemeClr val="accent6">
+              <a:shade val="50000"/>
+            </a:schemeClr>
+          </a:lnRef>
+          <a:fillRef idx="1">
+            <a:schemeClr val="accent6"/>
+          </a:fillRef>
+          <a:effectRef idx="0">
+            <a:schemeClr val="accent6"/>
+          </a:effectRef>
+          <a:fontRef idx="minor">
+            <a:schemeClr val="lt1"/>
+          </a:fontRef>
+        </p:style>
+        <p:txBody>
+          <a:bodyPr anchor="ctr"/>
+          <a:lstStyle/>
+          <a:p>
+            <a:pPr algn="ctr" fontAlgn="auto">
+              <a:spcBef>
+                <a:spcPts val="0"/>
+              </a:spcBef>
+              <a:spcAft>
+                <a:spcPts val="0"/>
+              </a:spcAft>
+              <a:defRPr/>
+            </a:pPr>
+            <a:r>
+              <a:rPr lang="pt-PT" dirty="0" smtClean="0"/>
+              <a:t>Codificador de Video</a:t>
+            </a:r>
+            <a:endParaRPr lang="pt-PT" dirty="0"/>
+          </a:p>
+        </p:txBody>
+      </p:sp>
+      <p:sp>
+        <p:nvSpPr>
+          <p:cNvPr id="60" name="Retângulo de cantos arredondados 59"/>
+          <p:cNvSpPr/>
+          <p:nvPr/>
+        </p:nvSpPr>
+        <p:spPr>
+          <a:xfrm>
+            <a:off x="2668713" y="3661356"/>
+            <a:ext cx="1504411" cy="523875"/>
+          </a:xfrm>
+          <a:prstGeom prst="roundRect">
+            <a:avLst/>
+          </a:prstGeom>
+        </p:spPr>
+        <p:style>
+          <a:lnRef idx="2">
+            <a:schemeClr val="accent6">
+              <a:shade val="50000"/>
+            </a:schemeClr>
+          </a:lnRef>
+          <a:fillRef idx="1">
+            <a:schemeClr val="accent6"/>
+          </a:fillRef>
+          <a:effectRef idx="0">
+            <a:schemeClr val="accent6"/>
+          </a:effectRef>
+          <a:fontRef idx="minor">
+            <a:schemeClr val="lt1"/>
+          </a:fontRef>
+        </p:style>
+        <p:txBody>
+          <a:bodyPr anchor="ctr"/>
+          <a:lstStyle/>
+          <a:p>
+            <a:pPr algn="ctr" fontAlgn="auto">
+              <a:spcBef>
+                <a:spcPts val="0"/>
+              </a:spcBef>
+              <a:spcAft>
+                <a:spcPts val="0"/>
+              </a:spcAft>
+              <a:defRPr/>
+            </a:pPr>
+            <a:r>
+              <a:rPr lang="pt-PT" dirty="0"/>
+              <a:t>Codificador </a:t>
+            </a:r>
+            <a:r>
+              <a:rPr lang="pt-PT" dirty="0" smtClean="0"/>
+              <a:t>de Áudio</a:t>
+            </a:r>
+            <a:endParaRPr lang="pt-PT" dirty="0"/>
+          </a:p>
+        </p:txBody>
+      </p:sp>
+      <p:sp>
+        <p:nvSpPr>
+          <p:cNvPr id="61" name="Retângulo de cantos arredondados 60"/>
+          <p:cNvSpPr/>
+          <p:nvPr/>
+        </p:nvSpPr>
+        <p:spPr>
+          <a:xfrm>
+            <a:off x="2681413" y="4306658"/>
+            <a:ext cx="1479011" cy="577851"/>
+          </a:xfrm>
+          <a:prstGeom prst="roundRect">
+            <a:avLst/>
+          </a:prstGeom>
+        </p:spPr>
+        <p:style>
+          <a:lnRef idx="2">
+            <a:schemeClr val="accent6">
+              <a:shade val="50000"/>
+            </a:schemeClr>
+          </a:lnRef>
+          <a:fillRef idx="1">
+            <a:schemeClr val="accent6"/>
+          </a:fillRef>
+          <a:effectRef idx="0">
+            <a:schemeClr val="accent6"/>
+          </a:effectRef>
+          <a:fontRef idx="minor">
+            <a:schemeClr val="lt1"/>
+          </a:fontRef>
+        </p:style>
+        <p:txBody>
+          <a:bodyPr anchor="ctr"/>
+          <a:lstStyle/>
+          <a:p>
+            <a:pPr algn="ctr" fontAlgn="auto">
+              <a:spcBef>
+                <a:spcPts val="0"/>
+              </a:spcBef>
+              <a:spcAft>
+                <a:spcPts val="0"/>
+              </a:spcAft>
+              <a:defRPr/>
+            </a:pPr>
+            <a:r>
+              <a:rPr lang="pt-PT" dirty="0"/>
+              <a:t>Codificador de Video</a:t>
+            </a:r>
+            <a:endParaRPr lang="pt-PT" dirty="0"/>
+          </a:p>
+        </p:txBody>
+      </p:sp>
+      <p:sp>
+        <p:nvSpPr>
+          <p:cNvPr id="62" name="Retângulo de cantos arredondados 61"/>
+          <p:cNvSpPr/>
+          <p:nvPr/>
+        </p:nvSpPr>
+        <p:spPr>
+          <a:xfrm>
+            <a:off x="2656013" y="5035322"/>
+            <a:ext cx="1504411" cy="523875"/>
+          </a:xfrm>
+          <a:prstGeom prst="roundRect">
+            <a:avLst/>
+          </a:prstGeom>
+        </p:spPr>
+        <p:style>
+          <a:lnRef idx="2">
+            <a:schemeClr val="accent6">
+              <a:shade val="50000"/>
+            </a:schemeClr>
+          </a:lnRef>
+          <a:fillRef idx="1">
+            <a:schemeClr val="accent6"/>
+          </a:fillRef>
+          <a:effectRef idx="0">
+            <a:schemeClr val="accent6"/>
+          </a:effectRef>
+          <a:fontRef idx="minor">
+            <a:schemeClr val="lt1"/>
+          </a:fontRef>
+        </p:style>
+        <p:txBody>
+          <a:bodyPr anchor="ctr"/>
+          <a:lstStyle/>
+          <a:p>
+            <a:pPr algn="ctr" fontAlgn="auto">
+              <a:spcBef>
+                <a:spcPts val="0"/>
+              </a:spcBef>
+              <a:spcAft>
+                <a:spcPts val="0"/>
+              </a:spcAft>
+              <a:defRPr/>
+            </a:pPr>
+            <a:r>
+              <a:rPr lang="pt-PT" dirty="0"/>
+              <a:t>Codificador de Áudio</a:t>
+            </a:r>
+            <a:endParaRPr lang="pt-PT" dirty="0"/>
+          </a:p>
+        </p:txBody>
+      </p:sp>
+      <p:sp>
+        <p:nvSpPr>
+          <p:cNvPr id="128" name="Retângulo de cantos arredondados 127"/>
+          <p:cNvSpPr/>
+          <p:nvPr/>
+        </p:nvSpPr>
+        <p:spPr>
+          <a:xfrm>
+            <a:off x="3971576" y="2109531"/>
+            <a:ext cx="1134399" cy="3427625"/>
           </a:xfrm>
           <a:prstGeom prst="roundRect">
             <a:avLst/>
@@ -41377,66 +42850,14 @@
       </p:sp>
       <p:sp>
         <p:nvSpPr>
-          <p:cNvPr id="130" name="CaixaDeTexto 28"/>
-          <p:cNvSpPr txBox="1">
-            <a:spLocks noChangeArrowheads="1"/>
-          </p:cNvSpPr>
-          <p:nvPr/>
-        </p:nvSpPr>
-        <p:spPr bwMode="auto">
-          <a:xfrm>
-            <a:off x="5904408" y="2231820"/>
-            <a:ext cx="1357529" cy="1200329"/>
-          </a:xfrm>
-          <a:prstGeom prst="rect">
-            <a:avLst/>
-          </a:prstGeom>
-          <a:noFill/>
-          <a:ln w="9525">
-            <a:noFill/>
-            <a:miter lim="800000"/>
-            <a:headEnd/>
-            <a:tailEnd/>
-          </a:ln>
-        </p:spPr>
-        <p:txBody>
-          <a:bodyPr wrap="square">
-            <a:spAutoFit/>
-          </a:bodyPr>
-          <a:lstStyle/>
-          <a:p>
-            <a:pPr algn="ctr"/>
-            <a:r>
-              <a:rPr lang="pt-PT" dirty="0" smtClean="0">
-                <a:latin typeface="Calibri" pitchFamily="34" charset="0"/>
-              </a:rPr>
-              <a:t>Single Service</a:t>
-            </a:r>
-          </a:p>
-          <a:p>
-            <a:pPr algn="ctr"/>
-            <a:r>
-              <a:rPr lang="pt-PT" dirty="0" smtClean="0">
-                <a:latin typeface="Calibri" pitchFamily="34" charset="0"/>
-              </a:rPr>
-              <a:t>Transport Stream</a:t>
-            </a:r>
-            <a:endParaRPr lang="pt-BR" dirty="0">
-              <a:latin typeface="Calibri" pitchFamily="34" charset="0"/>
-            </a:endParaRPr>
-          </a:p>
-        </p:txBody>
-      </p:sp>
-      <p:sp>
-        <p:nvSpPr>
-          <p:cNvPr id="131" name="Retângulo de cantos arredondados 130"/>
+          <p:cNvPr id="129" name="Retângulo de cantos arredondados 128"/>
           <p:cNvSpPr/>
           <p:nvPr/>
         </p:nvSpPr>
         <p:spPr>
           <a:xfrm>
-            <a:off x="6015974" y="2296544"/>
-            <a:ext cx="1134399" cy="2550736"/>
+            <a:off x="8348870" y="2874948"/>
+            <a:ext cx="1134399" cy="2842033"/>
           </a:xfrm>
           <a:prstGeom prst="roundRect">
             <a:avLst/>
@@ -43669,12 +45090,20 @@
               <a:defRPr/>
             </a:pPr>
             <a:r>
+              <a:rPr lang="pt-PT" dirty="0">
+                <a:solidFill>
+                  <a:srgbClr val="002060"/>
+                </a:solidFill>
+              </a:rPr>
+              <a:t>Multiplexador </a:t>
+            </a:r>
+            <a:r>
               <a:rPr lang="pt-PT" dirty="0" smtClean="0">
                 <a:solidFill>
                   <a:srgbClr val="002060"/>
                 </a:solidFill>
               </a:rPr>
-              <a:t>MPEG2 Multiplexer</a:t>
+              <a:t>MPEG2</a:t>
             </a:r>
             <a:endParaRPr lang="pt-PT" dirty="0">
               <a:solidFill>
@@ -44073,6 +45502,326 @@
           </a:fontRef>
         </p:style>
       </p:cxnSp>
+      <p:sp>
+        <p:nvSpPr>
+          <p:cNvPr id="57" name="Retângulo de cantos arredondados 56"/>
+          <p:cNvSpPr/>
+          <p:nvPr/>
+        </p:nvSpPr>
+        <p:spPr>
+          <a:xfrm>
+            <a:off x="2694113" y="2932692"/>
+            <a:ext cx="1479011" cy="577851"/>
+          </a:xfrm>
+          <a:prstGeom prst="roundRect">
+            <a:avLst/>
+          </a:prstGeom>
+        </p:spPr>
+        <p:style>
+          <a:lnRef idx="2">
+            <a:schemeClr val="accent6">
+              <a:shade val="50000"/>
+            </a:schemeClr>
+          </a:lnRef>
+          <a:fillRef idx="1">
+            <a:schemeClr val="accent6"/>
+          </a:fillRef>
+          <a:effectRef idx="0">
+            <a:schemeClr val="accent6"/>
+          </a:effectRef>
+          <a:fontRef idx="minor">
+            <a:schemeClr val="lt1"/>
+          </a:fontRef>
+        </p:style>
+        <p:txBody>
+          <a:bodyPr anchor="ctr"/>
+          <a:lstStyle/>
+          <a:p>
+            <a:pPr algn="ctr" fontAlgn="auto">
+              <a:spcBef>
+                <a:spcPts val="0"/>
+              </a:spcBef>
+              <a:spcAft>
+                <a:spcPts val="0"/>
+              </a:spcAft>
+              <a:defRPr/>
+            </a:pPr>
+            <a:r>
+              <a:rPr lang="pt-PT" dirty="0" smtClean="0"/>
+              <a:t>Codificador de Video</a:t>
+            </a:r>
+            <a:endParaRPr lang="pt-PT" dirty="0"/>
+          </a:p>
+        </p:txBody>
+      </p:sp>
+      <p:sp>
+        <p:nvSpPr>
+          <p:cNvPr id="58" name="Retângulo de cantos arredondados 57"/>
+          <p:cNvSpPr/>
+          <p:nvPr/>
+        </p:nvSpPr>
+        <p:spPr>
+          <a:xfrm>
+            <a:off x="2668713" y="3661356"/>
+            <a:ext cx="1504411" cy="523875"/>
+          </a:xfrm>
+          <a:prstGeom prst="roundRect">
+            <a:avLst/>
+          </a:prstGeom>
+        </p:spPr>
+        <p:style>
+          <a:lnRef idx="2">
+            <a:schemeClr val="accent6">
+              <a:shade val="50000"/>
+            </a:schemeClr>
+          </a:lnRef>
+          <a:fillRef idx="1">
+            <a:schemeClr val="accent6"/>
+          </a:fillRef>
+          <a:effectRef idx="0">
+            <a:schemeClr val="accent6"/>
+          </a:effectRef>
+          <a:fontRef idx="minor">
+            <a:schemeClr val="lt1"/>
+          </a:fontRef>
+        </p:style>
+        <p:txBody>
+          <a:bodyPr anchor="ctr"/>
+          <a:lstStyle/>
+          <a:p>
+            <a:pPr algn="ctr" fontAlgn="auto">
+              <a:spcBef>
+                <a:spcPts val="0"/>
+              </a:spcBef>
+              <a:spcAft>
+                <a:spcPts val="0"/>
+              </a:spcAft>
+              <a:defRPr/>
+            </a:pPr>
+            <a:r>
+              <a:rPr lang="pt-PT" dirty="0"/>
+              <a:t>Codificador </a:t>
+            </a:r>
+            <a:r>
+              <a:rPr lang="pt-PT" dirty="0" smtClean="0"/>
+              <a:t>de Áudio</a:t>
+            </a:r>
+            <a:endParaRPr lang="pt-PT" dirty="0"/>
+          </a:p>
+        </p:txBody>
+      </p:sp>
+      <p:sp>
+        <p:nvSpPr>
+          <p:cNvPr id="63" name="Retângulo de cantos arredondados 62"/>
+          <p:cNvSpPr/>
+          <p:nvPr/>
+        </p:nvSpPr>
+        <p:spPr>
+          <a:xfrm>
+            <a:off x="2681413" y="4306658"/>
+            <a:ext cx="1479011" cy="577851"/>
+          </a:xfrm>
+          <a:prstGeom prst="roundRect">
+            <a:avLst/>
+          </a:prstGeom>
+        </p:spPr>
+        <p:style>
+          <a:lnRef idx="2">
+            <a:schemeClr val="accent6">
+              <a:shade val="50000"/>
+            </a:schemeClr>
+          </a:lnRef>
+          <a:fillRef idx="1">
+            <a:schemeClr val="accent6"/>
+          </a:fillRef>
+          <a:effectRef idx="0">
+            <a:schemeClr val="accent6"/>
+          </a:effectRef>
+          <a:fontRef idx="minor">
+            <a:schemeClr val="lt1"/>
+          </a:fontRef>
+        </p:style>
+        <p:txBody>
+          <a:bodyPr anchor="ctr"/>
+          <a:lstStyle/>
+          <a:p>
+            <a:pPr algn="ctr" fontAlgn="auto">
+              <a:spcBef>
+                <a:spcPts val="0"/>
+              </a:spcBef>
+              <a:spcAft>
+                <a:spcPts val="0"/>
+              </a:spcAft>
+              <a:defRPr/>
+            </a:pPr>
+            <a:r>
+              <a:rPr lang="pt-PT" dirty="0"/>
+              <a:t>Codificador de Video</a:t>
+            </a:r>
+            <a:endParaRPr lang="pt-PT" dirty="0"/>
+          </a:p>
+        </p:txBody>
+      </p:sp>
+      <p:sp>
+        <p:nvSpPr>
+          <p:cNvPr id="64" name="Retângulo de cantos arredondados 63"/>
+          <p:cNvSpPr/>
+          <p:nvPr/>
+        </p:nvSpPr>
+        <p:spPr>
+          <a:xfrm>
+            <a:off x="2656013" y="5035322"/>
+            <a:ext cx="1504411" cy="523875"/>
+          </a:xfrm>
+          <a:prstGeom prst="roundRect">
+            <a:avLst/>
+          </a:prstGeom>
+        </p:spPr>
+        <p:style>
+          <a:lnRef idx="2">
+            <a:schemeClr val="accent6">
+              <a:shade val="50000"/>
+            </a:schemeClr>
+          </a:lnRef>
+          <a:fillRef idx="1">
+            <a:schemeClr val="accent6"/>
+          </a:fillRef>
+          <a:effectRef idx="0">
+            <a:schemeClr val="accent6"/>
+          </a:effectRef>
+          <a:fontRef idx="minor">
+            <a:schemeClr val="lt1"/>
+          </a:fontRef>
+        </p:style>
+        <p:txBody>
+          <a:bodyPr anchor="ctr"/>
+          <a:lstStyle/>
+          <a:p>
+            <a:pPr algn="ctr" fontAlgn="auto">
+              <a:spcBef>
+                <a:spcPts val="0"/>
+              </a:spcBef>
+              <a:spcAft>
+                <a:spcPts val="0"/>
+              </a:spcAft>
+              <a:defRPr/>
+            </a:pPr>
+            <a:r>
+              <a:rPr lang="pt-PT" dirty="0"/>
+              <a:t>Codificador de Áudio</a:t>
+            </a:r>
+            <a:endParaRPr lang="pt-PT" dirty="0"/>
+          </a:p>
+        </p:txBody>
+      </p:sp>
+      <p:sp>
+        <p:nvSpPr>
+          <p:cNvPr id="71" name="Retângulo de cantos arredondados 70"/>
+          <p:cNvSpPr/>
+          <p:nvPr/>
+        </p:nvSpPr>
+        <p:spPr>
+          <a:xfrm>
+            <a:off x="9249677" y="5274188"/>
+            <a:ext cx="1790700" cy="577851"/>
+          </a:xfrm>
+          <a:prstGeom prst="roundRect">
+            <a:avLst/>
+          </a:prstGeom>
+        </p:spPr>
+        <p:style>
+          <a:lnRef idx="2">
+            <a:schemeClr val="accent6">
+              <a:shade val="50000"/>
+            </a:schemeClr>
+          </a:lnRef>
+          <a:fillRef idx="1">
+            <a:schemeClr val="accent6"/>
+          </a:fillRef>
+          <a:effectRef idx="0">
+            <a:schemeClr val="accent6"/>
+          </a:effectRef>
+          <a:fontRef idx="minor">
+            <a:schemeClr val="lt1"/>
+          </a:fontRef>
+        </p:style>
+        <p:txBody>
+          <a:bodyPr anchor="ctr"/>
+          <a:lstStyle/>
+          <a:p>
+            <a:pPr algn="ctr" fontAlgn="auto">
+              <a:spcBef>
+                <a:spcPts val="0"/>
+              </a:spcBef>
+              <a:spcAft>
+                <a:spcPts val="0"/>
+              </a:spcAft>
+              <a:defRPr/>
+            </a:pPr>
+            <a:r>
+              <a:rPr lang="pt-PT" sz="1600" dirty="0" smtClean="0"/>
+              <a:t>Codif. De </a:t>
+            </a:r>
+            <a:r>
+              <a:rPr lang="pt-PT" sz="1600" dirty="0" smtClean="0"/>
+              <a:t>Correção de Erros</a:t>
+            </a:r>
+            <a:endParaRPr lang="pt-PT" sz="1600" dirty="0"/>
+          </a:p>
+        </p:txBody>
+      </p:sp>
+      <p:sp>
+        <p:nvSpPr>
+          <p:cNvPr id="76" name="Retângulo de cantos arredondados 75"/>
+          <p:cNvSpPr/>
+          <p:nvPr/>
+        </p:nvSpPr>
+        <p:spPr>
+          <a:xfrm>
+            <a:off x="9248539" y="4501035"/>
+            <a:ext cx="1790700" cy="425451"/>
+          </a:xfrm>
+          <a:prstGeom prst="roundRect">
+            <a:avLst/>
+          </a:prstGeom>
+        </p:spPr>
+        <p:style>
+          <a:lnRef idx="2">
+            <a:schemeClr val="accent6">
+              <a:shade val="50000"/>
+            </a:schemeClr>
+          </a:lnRef>
+          <a:fillRef idx="1">
+            <a:schemeClr val="accent6"/>
+          </a:fillRef>
+          <a:effectRef idx="0">
+            <a:schemeClr val="accent6"/>
+          </a:effectRef>
+          <a:fontRef idx="minor">
+            <a:schemeClr val="lt1"/>
+          </a:fontRef>
+        </p:style>
+        <p:txBody>
+          <a:bodyPr anchor="ctr"/>
+          <a:lstStyle/>
+          <a:p>
+            <a:pPr algn="ctr" fontAlgn="auto">
+              <a:spcBef>
+                <a:spcPts val="0"/>
+              </a:spcBef>
+              <a:spcAft>
+                <a:spcPts val="0"/>
+              </a:spcAft>
+              <a:defRPr/>
+            </a:pPr>
+            <a:r>
+              <a:rPr lang="pt-PT" dirty="0" smtClean="0"/>
+              <a:t>Modulador</a:t>
+            </a:r>
+            <a:endParaRPr lang="pt-PT" dirty="0"/>
+          </a:p>
+        </p:txBody>
+      </p:sp>
     </p:spTree>
     <p:extLst>
       <p:ext uri="{BB962C8B-B14F-4D97-AF65-F5344CB8AC3E}">

</xml_diff>